<commit_message>
update bcpst presentation file
</commit_message>
<xml_diff>
--- a/Icons_UI/bcpst.pptx
+++ b/Icons_UI/bcpst.pptx
@@ -865,7 +865,7 @@
         </p:nvSpPr>
         <p:spPr>
           <a:xfrm>
-            <a:off x="1528959" y="867631"/>
+            <a:off x="1528959" y="1721071"/>
             <a:ext cx="937260" cy="652166"/>
           </a:xfrm>
           <a:prstGeom prst="roundRect">
@@ -917,7 +917,7 @@
         </p:nvSpPr>
         <p:spPr>
           <a:xfrm>
-            <a:off x="7421444" y="867632"/>
+            <a:off x="7421444" y="1721072"/>
             <a:ext cx="932818" cy="652165"/>
           </a:xfrm>
           <a:custGeom>
@@ -1110,7 +1110,7 @@
         </p:nvSpPr>
         <p:spPr>
           <a:xfrm>
-            <a:off x="5958835" y="867632"/>
+            <a:off x="5958835" y="1721072"/>
             <a:ext cx="937260" cy="652165"/>
           </a:xfrm>
           <a:prstGeom prst="rect">
@@ -1164,7 +1164,7 @@
         </p:nvSpPr>
         <p:spPr>
           <a:xfrm rot="16200000" flipH="1">
-            <a:off x="4921949" y="725085"/>
+            <a:off x="4921949" y="1578525"/>
             <a:ext cx="652164" cy="937260"/>
           </a:xfrm>
           <a:custGeom>
@@ -1565,7 +1565,7 @@
         </p:nvSpPr>
         <p:spPr>
           <a:xfrm>
-            <a:off x="3603083" y="867632"/>
+            <a:off x="3603083" y="1721072"/>
             <a:ext cx="937260" cy="652164"/>
           </a:xfrm>
           <a:custGeom>
@@ -1782,7 +1782,7 @@
         </p:nvSpPr>
         <p:spPr>
           <a:xfrm>
-            <a:off x="5094784" y="1795299"/>
+            <a:off x="5094784" y="2648739"/>
             <a:ext cx="306494" cy="369332"/>
           </a:xfrm>
           <a:prstGeom prst="rect">
@@ -1817,7 +1817,7 @@
         </p:nvSpPr>
         <p:spPr>
           <a:xfrm>
-            <a:off x="1844342" y="1795299"/>
+            <a:off x="1844342" y="2648739"/>
             <a:ext cx="306494" cy="369332"/>
           </a:xfrm>
           <a:prstGeom prst="rect">
@@ -1852,7 +1852,7 @@
         </p:nvSpPr>
         <p:spPr>
           <a:xfrm>
-            <a:off x="6290248" y="1795299"/>
+            <a:off x="6290248" y="2648739"/>
             <a:ext cx="274434" cy="369332"/>
           </a:xfrm>
           <a:prstGeom prst="rect">
@@ -1887,7 +1887,7 @@
         </p:nvSpPr>
         <p:spPr>
           <a:xfrm>
-            <a:off x="3930488" y="1795299"/>
+            <a:off x="3930488" y="2648739"/>
             <a:ext cx="282450" cy="369332"/>
           </a:xfrm>
           <a:prstGeom prst="rect">
@@ -1922,7 +1922,7 @@
         </p:nvSpPr>
         <p:spPr>
           <a:xfrm>
-            <a:off x="7757048" y="1795299"/>
+            <a:off x="7757048" y="2648739"/>
             <a:ext cx="261610" cy="369332"/>
           </a:xfrm>
           <a:prstGeom prst="rect">
@@ -1957,7 +1957,7 @@
         </p:nvSpPr>
         <p:spPr>
           <a:xfrm>
-            <a:off x="1528959" y="2440132"/>
+            <a:off x="1528959" y="3293572"/>
             <a:ext cx="937260" cy="652166"/>
           </a:xfrm>
           <a:prstGeom prst="roundRect">
@@ -2009,7 +2009,7 @@
         </p:nvSpPr>
         <p:spPr>
           <a:xfrm>
-            <a:off x="7421444" y="2440133"/>
+            <a:off x="7421444" y="3293573"/>
             <a:ext cx="932818" cy="652165"/>
           </a:xfrm>
           <a:custGeom>
@@ -2202,7 +2202,7 @@
         </p:nvSpPr>
         <p:spPr>
           <a:xfrm>
-            <a:off x="5958835" y="2440133"/>
+            <a:off x="5958835" y="3293573"/>
             <a:ext cx="937260" cy="652165"/>
           </a:xfrm>
           <a:prstGeom prst="rect">
@@ -2256,7 +2256,7 @@
         </p:nvSpPr>
         <p:spPr>
           <a:xfrm rot="16200000" flipH="1">
-            <a:off x="4921949" y="2297586"/>
+            <a:off x="4921949" y="3151026"/>
             <a:ext cx="652164" cy="937260"/>
           </a:xfrm>
           <a:custGeom>
@@ -2657,7 +2657,7 @@
         </p:nvSpPr>
         <p:spPr>
           <a:xfrm>
-            <a:off x="3603083" y="2440133"/>
+            <a:off x="3603083" y="3293573"/>
             <a:ext cx="937260" cy="652164"/>
           </a:xfrm>
           <a:custGeom>
@@ -2828,6 +2828,344 @@
           </a:custGeom>
           <a:solidFill>
             <a:schemeClr val="bg1"/>
+          </a:solidFill>
+          <a:ln>
+            <a:noFill/>
+          </a:ln>
+        </p:spPr>
+        <p:style>
+          <a:lnRef idx="2">
+            <a:schemeClr val="accent1">
+              <a:shade val="15000"/>
+            </a:schemeClr>
+          </a:lnRef>
+          <a:fillRef idx="1">
+            <a:schemeClr val="accent1"/>
+          </a:fillRef>
+          <a:effectRef idx="0">
+            <a:schemeClr val="accent1"/>
+          </a:effectRef>
+          <a:fontRef idx="minor">
+            <a:schemeClr val="lt1"/>
+          </a:fontRef>
+        </p:style>
+        <p:txBody>
+          <a:bodyPr wrap="square" rtlCol="0" anchor="ctr">
+            <a:noAutofit/>
+          </a:bodyPr>
+          <a:lstStyle/>
+          <a:p>
+            <a:pPr algn="ctr"/>
+            <a:endParaRPr lang="en-US"/>
+          </a:p>
+        </p:txBody>
+      </p:sp>
+      <p:sp>
+        <p:nvSpPr>
+          <p:cNvPr id="18" name="Freeform: Shape 17">
+            <a:extLst>
+              <a:ext uri="{FF2B5EF4-FFF2-40B4-BE49-F238E27FC236}">
+                <a16:creationId xmlns:a16="http://schemas.microsoft.com/office/drawing/2014/main" id="{2C865D70-0832-B887-4436-883C59050DA9}"/>
+              </a:ext>
+            </a:extLst>
+          </p:cNvPr>
+          <p:cNvSpPr/>
+          <p:nvPr/>
+        </p:nvSpPr>
+        <p:spPr>
+          <a:xfrm>
+            <a:off x="5958835" y="834530"/>
+            <a:ext cx="937260" cy="649524"/>
+          </a:xfrm>
+          <a:custGeom>
+            <a:avLst/>
+            <a:gdLst>
+              <a:gd name="csX0" fmla="*/ 0 w 937260"/>
+              <a:gd name="csY0" fmla="*/ 0 h 649524"/>
+              <a:gd name="csX1" fmla="*/ 29480 w 937260"/>
+              <a:gd name="csY1" fmla="*/ 6421 h 649524"/>
+              <a:gd name="csX2" fmla="*/ 468630 w 937260"/>
+              <a:gd name="csY2" fmla="*/ 42000 h 649524"/>
+              <a:gd name="csX3" fmla="*/ 907780 w 937260"/>
+              <a:gd name="csY3" fmla="*/ 6421 h 649524"/>
+              <a:gd name="csX4" fmla="*/ 937260 w 937260"/>
+              <a:gd name="csY4" fmla="*/ 0 h 649524"/>
+              <a:gd name="csX5" fmla="*/ 937260 w 937260"/>
+              <a:gd name="csY5" fmla="*/ 649524 h 649524"/>
+              <a:gd name="csX6" fmla="*/ 907780 w 937260"/>
+              <a:gd name="csY6" fmla="*/ 643103 h 649524"/>
+              <a:gd name="csX7" fmla="*/ 468630 w 937260"/>
+              <a:gd name="csY7" fmla="*/ 607524 h 649524"/>
+              <a:gd name="csX8" fmla="*/ 29480 w 937260"/>
+              <a:gd name="csY8" fmla="*/ 643103 h 649524"/>
+              <a:gd name="csX9" fmla="*/ 0 w 937260"/>
+              <a:gd name="csY9" fmla="*/ 649524 h 649524"/>
+            </a:gdLst>
+            <a:ahLst/>
+            <a:cxnLst>
+              <a:cxn ang="0">
+                <a:pos x="csX0" y="csY0"/>
+              </a:cxn>
+              <a:cxn ang="0">
+                <a:pos x="csX1" y="csY1"/>
+              </a:cxn>
+              <a:cxn ang="0">
+                <a:pos x="csX2" y="csY2"/>
+              </a:cxn>
+              <a:cxn ang="0">
+                <a:pos x="csX3" y="csY3"/>
+              </a:cxn>
+              <a:cxn ang="0">
+                <a:pos x="csX4" y="csY4"/>
+              </a:cxn>
+              <a:cxn ang="0">
+                <a:pos x="csX5" y="csY5"/>
+              </a:cxn>
+              <a:cxn ang="0">
+                <a:pos x="csX6" y="csY6"/>
+              </a:cxn>
+              <a:cxn ang="0">
+                <a:pos x="csX7" y="csY7"/>
+              </a:cxn>
+              <a:cxn ang="0">
+                <a:pos x="csX8" y="csY8"/>
+              </a:cxn>
+              <a:cxn ang="0">
+                <a:pos x="csX9" y="csY9"/>
+              </a:cxn>
+            </a:cxnLst>
+            <a:rect l="l" t="t" r="r" b="b"/>
+            <a:pathLst>
+              <a:path w="937260" h="649524">
+                <a:moveTo>
+                  <a:pt x="0" y="0"/>
+                </a:moveTo>
+                <a:lnTo>
+                  <a:pt x="29480" y="6421"/>
+                </a:lnTo>
+                <a:cubicBezTo>
+                  <a:pt x="164457" y="29331"/>
+                  <a:pt x="312857" y="42000"/>
+                  <a:pt x="468630" y="42000"/>
+                </a:cubicBezTo>
+                <a:cubicBezTo>
+                  <a:pt x="624404" y="42000"/>
+                  <a:pt x="772803" y="29331"/>
+                  <a:pt x="907780" y="6421"/>
+                </a:cubicBezTo>
+                <a:lnTo>
+                  <a:pt x="937260" y="0"/>
+                </a:lnTo>
+                <a:lnTo>
+                  <a:pt x="937260" y="649524"/>
+                </a:lnTo>
+                <a:lnTo>
+                  <a:pt x="907780" y="643103"/>
+                </a:lnTo>
+                <a:cubicBezTo>
+                  <a:pt x="772803" y="620193"/>
+                  <a:pt x="624404" y="607524"/>
+                  <a:pt x="468630" y="607524"/>
+                </a:cubicBezTo>
+                <a:cubicBezTo>
+                  <a:pt x="312857" y="607524"/>
+                  <a:pt x="164457" y="620193"/>
+                  <a:pt x="29480" y="643103"/>
+                </a:cubicBezTo>
+                <a:lnTo>
+                  <a:pt x="0" y="649524"/>
+                </a:lnTo>
+                <a:close/>
+              </a:path>
+            </a:pathLst>
+          </a:custGeom>
+          <a:solidFill>
+            <a:srgbClr val="36E67F"/>
+          </a:solidFill>
+          <a:ln>
+            <a:noFill/>
+          </a:ln>
+        </p:spPr>
+        <p:style>
+          <a:lnRef idx="2">
+            <a:schemeClr val="accent1">
+              <a:shade val="15000"/>
+            </a:schemeClr>
+          </a:lnRef>
+          <a:fillRef idx="1">
+            <a:schemeClr val="accent1"/>
+          </a:fillRef>
+          <a:effectRef idx="0">
+            <a:schemeClr val="accent1"/>
+          </a:effectRef>
+          <a:fontRef idx="minor">
+            <a:schemeClr val="lt1"/>
+          </a:fontRef>
+        </p:style>
+        <p:txBody>
+          <a:bodyPr wrap="square" rtlCol="0" anchor="ctr">
+            <a:noAutofit/>
+          </a:bodyPr>
+          <a:lstStyle/>
+          <a:p>
+            <a:pPr algn="ctr"/>
+            <a:endParaRPr lang="en-US"/>
+          </a:p>
+        </p:txBody>
+      </p:sp>
+      <p:sp>
+        <p:nvSpPr>
+          <p:cNvPr id="15" name="Freeform: Shape 14">
+            <a:extLst>
+              <a:ext uri="{FF2B5EF4-FFF2-40B4-BE49-F238E27FC236}">
+                <a16:creationId xmlns:a16="http://schemas.microsoft.com/office/drawing/2014/main" id="{B231A9A5-1710-4C6B-848A-D5C60834FE34}"/>
+              </a:ext>
+            </a:extLst>
+          </p:cNvPr>
+          <p:cNvSpPr/>
+          <p:nvPr/>
+        </p:nvSpPr>
+        <p:spPr>
+          <a:xfrm>
+            <a:off x="5958835" y="46959"/>
+            <a:ext cx="937260" cy="652165"/>
+          </a:xfrm>
+          <a:custGeom>
+            <a:avLst/>
+            <a:gdLst>
+              <a:gd name="csX0" fmla="*/ 0 w 937260"/>
+              <a:gd name="csY0" fmla="*/ 0 h 652165"/>
+              <a:gd name="csX1" fmla="*/ 179 w 937260"/>
+              <a:gd name="csY1" fmla="*/ 0 h 652165"/>
+              <a:gd name="csX2" fmla="*/ 116373 w 937260"/>
+              <a:gd name="csY2" fmla="*/ 31552 h 652165"/>
+              <a:gd name="csX3" fmla="*/ 468630 w 937260"/>
+              <a:gd name="csY3" fmla="*/ 67131 h 652165"/>
+              <a:gd name="csX4" fmla="*/ 820887 w 937260"/>
+              <a:gd name="csY4" fmla="*/ 31552 h 652165"/>
+              <a:gd name="csX5" fmla="*/ 937081 w 937260"/>
+              <a:gd name="csY5" fmla="*/ 0 h 652165"/>
+              <a:gd name="csX6" fmla="*/ 937260 w 937260"/>
+              <a:gd name="csY6" fmla="*/ 0 h 652165"/>
+              <a:gd name="csX7" fmla="*/ 937260 w 937260"/>
+              <a:gd name="csY7" fmla="*/ 652165 h 652165"/>
+              <a:gd name="csX8" fmla="*/ 937078 w 937260"/>
+              <a:gd name="csY8" fmla="*/ 652165 h 652165"/>
+              <a:gd name="csX9" fmla="*/ 820887 w 937260"/>
+              <a:gd name="csY9" fmla="*/ 620614 h 652165"/>
+              <a:gd name="csX10" fmla="*/ 468630 w 937260"/>
+              <a:gd name="csY10" fmla="*/ 585035 h 652165"/>
+              <a:gd name="csX11" fmla="*/ 116373 w 937260"/>
+              <a:gd name="csY11" fmla="*/ 620614 h 652165"/>
+              <a:gd name="csX12" fmla="*/ 183 w 937260"/>
+              <a:gd name="csY12" fmla="*/ 652165 h 652165"/>
+              <a:gd name="csX13" fmla="*/ 0 w 937260"/>
+              <a:gd name="csY13" fmla="*/ 652165 h 652165"/>
+            </a:gdLst>
+            <a:ahLst/>
+            <a:cxnLst>
+              <a:cxn ang="0">
+                <a:pos x="csX0" y="csY0"/>
+              </a:cxn>
+              <a:cxn ang="0">
+                <a:pos x="csX1" y="csY1"/>
+              </a:cxn>
+              <a:cxn ang="0">
+                <a:pos x="csX2" y="csY2"/>
+              </a:cxn>
+              <a:cxn ang="0">
+                <a:pos x="csX3" y="csY3"/>
+              </a:cxn>
+              <a:cxn ang="0">
+                <a:pos x="csX4" y="csY4"/>
+              </a:cxn>
+              <a:cxn ang="0">
+                <a:pos x="csX5" y="csY5"/>
+              </a:cxn>
+              <a:cxn ang="0">
+                <a:pos x="csX6" y="csY6"/>
+              </a:cxn>
+              <a:cxn ang="0">
+                <a:pos x="csX7" y="csY7"/>
+              </a:cxn>
+              <a:cxn ang="0">
+                <a:pos x="csX8" y="csY8"/>
+              </a:cxn>
+              <a:cxn ang="0">
+                <a:pos x="csX9" y="csY9"/>
+              </a:cxn>
+              <a:cxn ang="0">
+                <a:pos x="csX10" y="csY10"/>
+              </a:cxn>
+              <a:cxn ang="0">
+                <a:pos x="csX11" y="csY11"/>
+              </a:cxn>
+              <a:cxn ang="0">
+                <a:pos x="csX12" y="csY12"/>
+              </a:cxn>
+              <a:cxn ang="0">
+                <a:pos x="csX13" y="csY13"/>
+              </a:cxn>
+            </a:cxnLst>
+            <a:rect l="l" t="t" r="r" b="b"/>
+            <a:pathLst>
+              <a:path w="937260" h="652165">
+                <a:moveTo>
+                  <a:pt x="0" y="0"/>
+                </a:moveTo>
+                <a:lnTo>
+                  <a:pt x="179" y="0"/>
+                </a:lnTo>
+                <a:lnTo>
+                  <a:pt x="116373" y="31552"/>
+                </a:lnTo>
+                <a:cubicBezTo>
+                  <a:pt x="224643" y="54462"/>
+                  <a:pt x="343679" y="67131"/>
+                  <a:pt x="468630" y="67131"/>
+                </a:cubicBezTo>
+                <a:cubicBezTo>
+                  <a:pt x="593581" y="67131"/>
+                  <a:pt x="712618" y="54462"/>
+                  <a:pt x="820887" y="31552"/>
+                </a:cubicBezTo>
+                <a:lnTo>
+                  <a:pt x="937081" y="0"/>
+                </a:lnTo>
+                <a:lnTo>
+                  <a:pt x="937260" y="0"/>
+                </a:lnTo>
+                <a:lnTo>
+                  <a:pt x="937260" y="652165"/>
+                </a:lnTo>
+                <a:lnTo>
+                  <a:pt x="937078" y="652165"/>
+                </a:lnTo>
+                <a:lnTo>
+                  <a:pt x="820887" y="620614"/>
+                </a:lnTo>
+                <a:cubicBezTo>
+                  <a:pt x="712618" y="597704"/>
+                  <a:pt x="593581" y="585035"/>
+                  <a:pt x="468630" y="585035"/>
+                </a:cubicBezTo>
+                <a:cubicBezTo>
+                  <a:pt x="343679" y="585035"/>
+                  <a:pt x="224643" y="597704"/>
+                  <a:pt x="116373" y="620614"/>
+                </a:cubicBezTo>
+                <a:lnTo>
+                  <a:pt x="183" y="652165"/>
+                </a:lnTo>
+                <a:lnTo>
+                  <a:pt x="0" y="652165"/>
+                </a:lnTo>
+                <a:close/>
+              </a:path>
+            </a:pathLst>
+          </a:custGeom>
+          <a:solidFill>
+            <a:srgbClr val="36E67F"/>
           </a:solidFill>
           <a:ln>
             <a:noFill/>

</xml_diff>